<commit_message>
added a link to the ppt
</commit_message>
<xml_diff>
--- a/BA Review Analysis.pptx
+++ b/BA Review Analysis.pptx
@@ -10228,7 +10228,7 @@
           <a:p>
             <a:fld id="{6670FE10-F406-47AF-8AE1-E9BA4C7E25F2}" type="datetimeFigureOut">
               <a:rPr lang="en-GB" smtClean="0"/>
-              <a:t>25/06/2023</a:t>
+              <a:t>26/06/2023</a:t>
             </a:fld>
             <a:endParaRPr lang="en-GB" dirty="0"/>
           </a:p>
@@ -10562,7 +10562,7 @@
           <a:p>
             <a:fld id="{6670FE10-F406-47AF-8AE1-E9BA4C7E25F2}" type="datetimeFigureOut">
               <a:rPr lang="en-GB" smtClean="0"/>
-              <a:t>25/06/2023</a:t>
+              <a:t>26/06/2023</a:t>
             </a:fld>
             <a:endParaRPr lang="en-GB"/>
           </a:p>
@@ -10772,7 +10772,7 @@
           <a:p>
             <a:fld id="{6670FE10-F406-47AF-8AE1-E9BA4C7E25F2}" type="datetimeFigureOut">
               <a:rPr lang="en-GB" smtClean="0"/>
-              <a:t>25/06/2023</a:t>
+              <a:t>26/06/2023</a:t>
             </a:fld>
             <a:endParaRPr lang="en-GB"/>
           </a:p>
@@ -10972,7 +10972,7 @@
           <a:p>
             <a:fld id="{6670FE10-F406-47AF-8AE1-E9BA4C7E25F2}" type="datetimeFigureOut">
               <a:rPr lang="en-GB" smtClean="0"/>
-              <a:t>25/06/2023</a:t>
+              <a:t>26/06/2023</a:t>
             </a:fld>
             <a:endParaRPr lang="en-GB"/>
           </a:p>
@@ -11379,7 +11379,7 @@
           <a:p>
             <a:fld id="{6670FE10-F406-47AF-8AE1-E9BA4C7E25F2}" type="datetimeFigureOut">
               <a:rPr lang="en-GB" smtClean="0"/>
-              <a:t>25/06/2023</a:t>
+              <a:t>26/06/2023</a:t>
             </a:fld>
             <a:endParaRPr lang="en-GB"/>
           </a:p>
@@ -11647,7 +11647,7 @@
           <a:p>
             <a:fld id="{6670FE10-F406-47AF-8AE1-E9BA4C7E25F2}" type="datetimeFigureOut">
               <a:rPr lang="en-GB" smtClean="0"/>
-              <a:t>25/06/2023</a:t>
+              <a:t>26/06/2023</a:t>
             </a:fld>
             <a:endParaRPr lang="en-GB"/>
           </a:p>
@@ -12062,7 +12062,7 @@
           <a:p>
             <a:fld id="{6670FE10-F406-47AF-8AE1-E9BA4C7E25F2}" type="datetimeFigureOut">
               <a:rPr lang="en-GB" smtClean="0"/>
-              <a:t>25/06/2023</a:t>
+              <a:t>26/06/2023</a:t>
             </a:fld>
             <a:endParaRPr lang="en-GB"/>
           </a:p>
@@ -12204,7 +12204,7 @@
           <a:p>
             <a:fld id="{6670FE10-F406-47AF-8AE1-E9BA4C7E25F2}" type="datetimeFigureOut">
               <a:rPr lang="en-GB" smtClean="0"/>
-              <a:t>25/06/2023</a:t>
+              <a:t>26/06/2023</a:t>
             </a:fld>
             <a:endParaRPr lang="en-GB"/>
           </a:p>
@@ -12317,7 +12317,7 @@
           <a:p>
             <a:fld id="{6670FE10-F406-47AF-8AE1-E9BA4C7E25F2}" type="datetimeFigureOut">
               <a:rPr lang="en-GB" smtClean="0"/>
-              <a:t>25/06/2023</a:t>
+              <a:t>26/06/2023</a:t>
             </a:fld>
             <a:endParaRPr lang="en-GB"/>
           </a:p>
@@ -12630,7 +12630,7 @@
           <a:p>
             <a:fld id="{6670FE10-F406-47AF-8AE1-E9BA4C7E25F2}" type="datetimeFigureOut">
               <a:rPr lang="en-GB" smtClean="0"/>
-              <a:t>25/06/2023</a:t>
+              <a:t>26/06/2023</a:t>
             </a:fld>
             <a:endParaRPr lang="en-GB"/>
           </a:p>
@@ -12919,7 +12919,7 @@
           <a:p>
             <a:fld id="{6670FE10-F406-47AF-8AE1-E9BA4C7E25F2}" type="datetimeFigureOut">
               <a:rPr lang="en-GB" smtClean="0"/>
-              <a:t>25/06/2023</a:t>
+              <a:t>26/06/2023</a:t>
             </a:fld>
             <a:endParaRPr lang="en-GB"/>
           </a:p>
@@ -13162,7 +13162,7 @@
           <a:p>
             <a:fld id="{6670FE10-F406-47AF-8AE1-E9BA4C7E25F2}" type="datetimeFigureOut">
               <a:rPr lang="en-GB" smtClean="0"/>
-              <a:t>25/06/2023</a:t>
+              <a:t>26/06/2023</a:t>
             </a:fld>
             <a:endParaRPr lang="en-GB"/>
           </a:p>
@@ -13628,6 +13628,12 @@
           <a:bodyPr/>
           <a:lstStyle/>
           <a:p>
+            <a:r>
+              <a:rPr lang="en-GB" dirty="0">
+                <a:hlinkClick r:id="rId2"/>
+              </a:rPr>
+              <a:t>https://gitlab.com/danielobare/british-airways-web-scrapping-4-company-insights</a:t>
+            </a:r>
             <a:endParaRPr lang="en-GB" dirty="0"/>
           </a:p>
         </p:txBody>

</xml_diff>